<commit_message>
Graficos em JSF com PrimeFaces
</commit_message>
<xml_diff>
--- a/ExecicioGraficos.pptx
+++ b/ExecicioGraficos.pptx
@@ -3149,6 +3149,13 @@
   <p:clrMapOvr>
     <a:masterClrMapping/>
   </p:clrMapOvr>
+  <p:timing>
+    <p:tnLst>
+      <p:par>
+        <p:cTn xmlns:p14="http://schemas.microsoft.com/office/powerpoint/2010/main" id="1" dur="indefinite" restart="never" nodeType="tmRoot"/>
+      </p:par>
+    </p:tnLst>
+  </p:timing>
 </p:sld>
 </file>
 
@@ -3186,11 +3193,7 @@
           <a:p>
             <a:r>
               <a:rPr lang="en-US" dirty="0" err="1" smtClean="0"/>
-              <a:t>Gr</a:t>
-            </a:r>
-            <a:r>
-              <a:rPr lang="en-US" dirty="0" err="1" smtClean="0"/>
-              <a:t>áficos</a:t>
+              <a:t>Gráficos</a:t>
             </a:r>
             <a:endParaRPr lang="en-US" dirty="0"/>
           </a:p>
@@ -3363,11 +3366,7 @@
             </a:r>
             <a:r>
               <a:rPr lang="en-US" dirty="0" err="1" smtClean="0"/>
-              <a:t>g</a:t>
-            </a:r>
-            <a:r>
-              <a:rPr lang="en-US" dirty="0" err="1" smtClean="0"/>
-              <a:t>áfico</a:t>
+              <a:t>gáfico</a:t>
             </a:r>
             <a:r>
               <a:rPr lang="en-US" dirty="0" smtClean="0"/>
@@ -3419,6 +3418,13 @@
   <p:clrMapOvr>
     <a:masterClrMapping/>
   </p:clrMapOvr>
+  <p:timing>
+    <p:tnLst>
+      <p:par>
+        <p:cTn xmlns:p14="http://schemas.microsoft.com/office/powerpoint/2010/main" id="1" dur="indefinite" restart="never" nodeType="tmRoot"/>
+      </p:par>
+    </p:tnLst>
+  </p:timing>
 </p:sld>
 </file>
 
@@ -3456,11 +3462,7 @@
           <a:p>
             <a:r>
               <a:rPr lang="en-US" dirty="0" err="1" smtClean="0"/>
-              <a:t>Gr</a:t>
-            </a:r>
-            <a:r>
-              <a:rPr lang="en-US" dirty="0" err="1" smtClean="0"/>
-              <a:t>áficos</a:t>
+              <a:t>Gráficos</a:t>
             </a:r>
             <a:endParaRPr lang="en-US" dirty="0"/>
           </a:p>
@@ -3499,27 +3501,177 @@
             </a:r>
             <a:r>
               <a:rPr lang="en-US" dirty="0" err="1" smtClean="0"/>
-              <a:t>aplica</a:t>
+              <a:t>aplicação</a:t>
+            </a:r>
+            <a:r>
+              <a:rPr lang="en-US" dirty="0" smtClean="0"/>
+              <a:t> </a:t>
+            </a:r>
+            <a:r>
+              <a:rPr lang="en-US" dirty="0" err="1" smtClean="0"/>
+              <a:t>usando</a:t>
+            </a:r>
+            <a:r>
+              <a:rPr lang="en-US" dirty="0" smtClean="0"/>
+              <a:t> agora um </a:t>
+            </a:r>
+            <a:r>
+              <a:rPr lang="en-US" dirty="0" err="1" smtClean="0"/>
+              <a:t>gráfico</a:t>
+            </a:r>
+            <a:r>
+              <a:rPr lang="en-US" dirty="0" smtClean="0"/>
+              <a:t> de </a:t>
+            </a:r>
+            <a:r>
+              <a:rPr lang="en-US" dirty="0" err="1" smtClean="0"/>
+              <a:t>linhas</a:t>
+            </a:r>
+            <a:r>
+              <a:rPr lang="en-US" dirty="0" smtClean="0"/>
+              <a:t>.   </a:t>
+            </a:r>
+          </a:p>
+          <a:p>
+            <a:r>
+              <a:rPr lang="en-US" dirty="0" smtClean="0"/>
+              <a:t>O professor, </a:t>
+            </a:r>
+            <a:r>
+              <a:rPr lang="en-US" dirty="0" err="1" smtClean="0"/>
+              <a:t>dessa</a:t>
+            </a:r>
+            <a:r>
+              <a:rPr lang="en-US" dirty="0" smtClean="0"/>
+              <a:t> </a:t>
+            </a:r>
+            <a:r>
+              <a:rPr lang="en-US" dirty="0" err="1" smtClean="0"/>
+              <a:t>vez</a:t>
+            </a:r>
+            <a:r>
+              <a:rPr lang="en-US" dirty="0" smtClean="0"/>
+              <a:t>, </a:t>
+            </a:r>
+            <a:r>
+              <a:rPr lang="en-US" dirty="0" err="1" smtClean="0"/>
+              <a:t>entra</a:t>
+            </a:r>
+            <a:r>
+              <a:rPr lang="en-US" dirty="0" smtClean="0"/>
+              <a:t> com o </a:t>
+            </a:r>
+            <a:r>
+              <a:rPr lang="en-US" dirty="0" err="1" smtClean="0"/>
+              <a:t>nome</a:t>
+            </a:r>
+            <a:r>
+              <a:rPr lang="en-US" dirty="0" smtClean="0"/>
+              <a:t> da </a:t>
+            </a:r>
+            <a:r>
+              <a:rPr lang="en-US" dirty="0" err="1" smtClean="0"/>
+              <a:t>avaliação</a:t>
+            </a:r>
+            <a:r>
+              <a:rPr lang="en-US" dirty="0" smtClean="0"/>
+              <a:t> e a nota </a:t>
+            </a:r>
+            <a:r>
+              <a:rPr lang="en-US" dirty="0" err="1" smtClean="0"/>
+              <a:t>média</a:t>
+            </a:r>
+            <a:r>
+              <a:rPr lang="en-US" dirty="0" smtClean="0"/>
+              <a:t> </a:t>
+            </a:r>
+            <a:r>
+              <a:rPr lang="en-US" dirty="0" smtClean="0"/>
+              <a:t>de </a:t>
+            </a:r>
+            <a:r>
+              <a:rPr lang="en-US" dirty="0" err="1" smtClean="0"/>
+              <a:t>cada</a:t>
+            </a:r>
+            <a:r>
+              <a:rPr lang="en-US" dirty="0" smtClean="0"/>
+              <a:t> </a:t>
+            </a:r>
+            <a:r>
+              <a:rPr lang="en-US" dirty="0" err="1" smtClean="0"/>
+              <a:t>avalia</a:t>
             </a:r>
             <a:r>
               <a:rPr lang="en-US" dirty="0" err="1" smtClean="0"/>
               <a:t>ção</a:t>
             </a:r>
             <a:r>
-              <a:rPr lang="en-US" dirty="0" smtClean="0"/>
+              <a:rPr lang="en-US" smtClean="0"/>
               <a:t> </a:t>
             </a:r>
             <a:r>
-              <a:rPr lang="en-US" dirty="0" err="1" smtClean="0"/>
-              <a:t>usando</a:t>
-            </a:r>
-            <a:r>
-              <a:rPr lang="en-US" dirty="0" smtClean="0"/>
-              <a:t> agora um </a:t>
-            </a:r>
-            <a:r>
-              <a:rPr lang="en-US" dirty="0" err="1" smtClean="0"/>
-              <a:t>gráfico</a:t>
+              <a:rPr lang="en-US" smtClean="0"/>
+              <a:t>(</a:t>
+            </a:r>
+            <a:r>
+              <a:rPr lang="en-US" dirty="0" err="1" smtClean="0"/>
+              <a:t>pode</a:t>
+            </a:r>
+            <a:r>
+              <a:rPr lang="en-US" dirty="0" smtClean="0"/>
+              <a:t> </a:t>
+            </a:r>
+            <a:r>
+              <a:rPr lang="en-US" dirty="0" err="1" smtClean="0"/>
+              <a:t>usar</a:t>
+            </a:r>
+            <a:r>
+              <a:rPr lang="en-US" dirty="0" smtClean="0"/>
+              <a:t> </a:t>
+            </a:r>
+            <a:r>
+              <a:rPr lang="en-US" dirty="0" err="1" smtClean="0"/>
+              <a:t>os</a:t>
+            </a:r>
+            <a:r>
+              <a:rPr lang="en-US" dirty="0" smtClean="0"/>
+              <a:t> dados da </a:t>
+            </a:r>
+            <a:r>
+              <a:rPr lang="en-US" dirty="0" err="1" smtClean="0"/>
+              <a:t>questão</a:t>
+            </a:r>
+            <a:r>
+              <a:rPr lang="en-US" dirty="0" smtClean="0"/>
+              <a:t> anterior) e o </a:t>
+            </a:r>
+            <a:r>
+              <a:rPr lang="en-US" dirty="0" err="1" smtClean="0"/>
+              <a:t>sistema</a:t>
+            </a:r>
+            <a:r>
+              <a:rPr lang="en-US" dirty="0" smtClean="0"/>
+              <a:t> </a:t>
+            </a:r>
+            <a:r>
+              <a:rPr lang="en-US" dirty="0" err="1" smtClean="0"/>
+              <a:t>exibe</a:t>
+            </a:r>
+            <a:r>
+              <a:rPr lang="en-US" dirty="0" smtClean="0"/>
+              <a:t> e </a:t>
+            </a:r>
+            <a:r>
+              <a:rPr lang="en-US" dirty="0" err="1" smtClean="0"/>
+              <a:t>atualiza</a:t>
+            </a:r>
+            <a:r>
+              <a:rPr lang="en-US" dirty="0" smtClean="0"/>
+              <a:t> um </a:t>
+            </a:r>
+            <a:r>
+              <a:rPr lang="en-US" dirty="0" err="1" smtClean="0"/>
+              <a:t>gáfico</a:t>
             </a:r>
             <a:r>
               <a:rPr lang="en-US" dirty="0" smtClean="0"/>
@@ -3527,160 +3679,10 @@
             </a:r>
             <a:r>
               <a:rPr lang="en-US" dirty="0" err="1" smtClean="0"/>
-              <a:t>linhas</a:t>
-            </a:r>
-            <a:r>
-              <a:rPr lang="en-US" dirty="0" smtClean="0"/>
-              <a:t>. </a:t>
-            </a:r>
-            <a:r>
-              <a:rPr lang="en-US" dirty="0" smtClean="0"/>
-              <a:t>  </a:t>
-            </a:r>
-          </a:p>
-          <a:p>
-            <a:r>
-              <a:rPr lang="en-US" dirty="0" smtClean="0"/>
-              <a:t>O professor, </a:t>
-            </a:r>
-            <a:r>
-              <a:rPr lang="en-US" dirty="0" err="1" smtClean="0"/>
-              <a:t>dessa</a:t>
-            </a:r>
-            <a:r>
-              <a:rPr lang="en-US" dirty="0" smtClean="0"/>
-              <a:t> </a:t>
-            </a:r>
-            <a:r>
-              <a:rPr lang="en-US" dirty="0" err="1" smtClean="0"/>
-              <a:t>vez</a:t>
-            </a:r>
-            <a:r>
-              <a:rPr lang="en-US" dirty="0" smtClean="0"/>
-              <a:t>, </a:t>
-            </a:r>
-            <a:r>
-              <a:rPr lang="en-US" dirty="0" err="1" smtClean="0"/>
-              <a:t>entra</a:t>
-            </a:r>
-            <a:r>
-              <a:rPr lang="en-US" dirty="0" smtClean="0"/>
-              <a:t> com o </a:t>
-            </a:r>
-            <a:r>
-              <a:rPr lang="en-US" dirty="0" err="1" smtClean="0"/>
-              <a:t>nome</a:t>
-            </a:r>
-            <a:r>
-              <a:rPr lang="en-US" dirty="0" smtClean="0"/>
-              <a:t> da </a:t>
-            </a:r>
-            <a:r>
-              <a:rPr lang="en-US" dirty="0" err="1" smtClean="0"/>
-              <a:t>avalia</a:t>
-            </a:r>
-            <a:r>
-              <a:rPr lang="en-US" dirty="0" err="1" smtClean="0"/>
-              <a:t>ção</a:t>
-            </a:r>
-            <a:r>
-              <a:rPr lang="en-US" dirty="0" smtClean="0"/>
-              <a:t> e</a:t>
-            </a:r>
-            <a:r>
-              <a:rPr lang="en-US" dirty="0" smtClean="0"/>
-              <a:t> a nota </a:t>
-            </a:r>
-            <a:r>
-              <a:rPr lang="en-US" dirty="0" err="1" smtClean="0"/>
-              <a:t>m</a:t>
-            </a:r>
-            <a:r>
-              <a:rPr lang="en-US" dirty="0" err="1" smtClean="0"/>
-              <a:t>édia</a:t>
-            </a:r>
-            <a:r>
-              <a:rPr lang="en-US" dirty="0" smtClean="0"/>
-              <a:t> (</a:t>
-            </a:r>
-            <a:r>
-              <a:rPr lang="en-US" dirty="0" err="1" smtClean="0"/>
-              <a:t>pode</a:t>
-            </a:r>
-            <a:r>
-              <a:rPr lang="en-US" dirty="0" smtClean="0"/>
-              <a:t> </a:t>
-            </a:r>
-            <a:r>
-              <a:rPr lang="en-US" dirty="0" err="1" smtClean="0"/>
-              <a:t>usar</a:t>
-            </a:r>
-            <a:r>
-              <a:rPr lang="en-US" dirty="0" smtClean="0"/>
-              <a:t> </a:t>
-            </a:r>
-            <a:r>
-              <a:rPr lang="en-US" dirty="0" err="1" smtClean="0"/>
-              <a:t>os</a:t>
-            </a:r>
-            <a:r>
-              <a:rPr lang="en-US" dirty="0" smtClean="0"/>
-              <a:t> dados da </a:t>
-            </a:r>
-            <a:r>
-              <a:rPr lang="en-US" dirty="0" err="1" smtClean="0"/>
-              <a:t>questão</a:t>
-            </a:r>
-            <a:r>
-              <a:rPr lang="en-US" dirty="0" smtClean="0"/>
-              <a:t> anterior) </a:t>
-            </a:r>
-            <a:r>
-              <a:rPr lang="en-US" dirty="0" smtClean="0"/>
-              <a:t>e o </a:t>
-            </a:r>
-            <a:r>
-              <a:rPr lang="en-US" dirty="0" err="1" smtClean="0"/>
-              <a:t>sistema</a:t>
-            </a:r>
-            <a:r>
-              <a:rPr lang="en-US" dirty="0" smtClean="0"/>
-              <a:t> </a:t>
-            </a:r>
-            <a:r>
-              <a:rPr lang="en-US" dirty="0" err="1" smtClean="0"/>
-              <a:t>exibe</a:t>
-            </a:r>
-            <a:r>
-              <a:rPr lang="en-US" dirty="0" smtClean="0"/>
-              <a:t> e </a:t>
-            </a:r>
-            <a:r>
-              <a:rPr lang="en-US" dirty="0" err="1" smtClean="0"/>
-              <a:t>atualiza</a:t>
-            </a:r>
-            <a:r>
-              <a:rPr lang="en-US" dirty="0" smtClean="0"/>
-              <a:t> um </a:t>
-            </a:r>
-            <a:r>
-              <a:rPr lang="en-US" dirty="0" err="1" smtClean="0"/>
-              <a:t>g</a:t>
-            </a:r>
-            <a:r>
-              <a:rPr lang="en-US" dirty="0" err="1" smtClean="0"/>
-              <a:t>áfico</a:t>
-            </a:r>
-            <a:r>
-              <a:rPr lang="en-US" dirty="0" smtClean="0"/>
-              <a:t> de </a:t>
-            </a:r>
-            <a:r>
-              <a:rPr lang="en-US" dirty="0" err="1" smtClean="0"/>
               <a:t>linas</a:t>
             </a:r>
             <a:r>
-              <a:rPr lang="en-US" smtClean="0"/>
+              <a:rPr lang="en-US" dirty="0" smtClean="0"/>
               <a:t>.</a:t>
             </a:r>
             <a:endParaRPr lang="en-US" dirty="0"/>
@@ -3697,6 +3699,13 @@
   <p:clrMapOvr>
     <a:masterClrMapping/>
   </p:clrMapOvr>
+  <p:timing>
+    <p:tnLst>
+      <p:par>
+        <p:cTn xmlns:p14="http://schemas.microsoft.com/office/powerpoint/2010/main" id="1" dur="indefinite" restart="never" nodeType="tmRoot"/>
+      </p:par>
+    </p:tnLst>
+  </p:timing>
 </p:sld>
 </file>
 

</xml_diff>